<commit_message>
fixed slideshow, pushing final module
</commit_message>
<xml_diff>
--- a/Presentations/Presentations Power Point/07_refactoring.pptx
+++ b/Presentations/Presentations Power Point/07_refactoring.pptx
@@ -321,6 +321,11 @@
       </a:defRPr>
     </a:lvl9pPr>
   </p:defaultTextStyle>
+  <p:extLst>
+    <p:ext uri="{EFAFB233-063F-42B5-8137-9DF3F51BA10A}">
+      <p15:sldGuideLst xmlns:p15="http://schemas.microsoft.com/office/powerpoint/2012/main"/>
+    </p:ext>
+  </p:extLst>
 </p:presentation>
 </file>
 
@@ -2101,7 +2106,7 @@
           </a:ln>
           <a:extLst>
             <a:ext uri="{C572A759-6A51-4108-AA02-DFA0A04FC94B}">
-              <ma14:wrappingTextBoxFlag xmlns:ma14="http://schemas.microsoft.com/office/mac/drawingml/2011/main" xmlns:a14="http://schemas.microsoft.com/office/drawing/2010/main" xmlns:m="http://schemas.openxmlformats.org/officeDocument/2006/math" xmlns="" val="1"/>
+              <ma14:wrappingTextBoxFlag xmlns="" xmlns:m="http://schemas.openxmlformats.org/officeDocument/2006/math" xmlns:a14="http://schemas.microsoft.com/office/drawing/2010/main" xmlns:ma14="http://schemas.microsoft.com/office/mac/drawingml/2011/main" val="1"/>
             </a:ext>
           </a:extLst>
         </p:spPr>
@@ -2140,7 +2145,7 @@
           </a:ln>
           <a:extLst>
             <a:ext uri="{C572A759-6A51-4108-AA02-DFA0A04FC94B}">
-              <ma14:wrappingTextBoxFlag xmlns:ma14="http://schemas.microsoft.com/office/mac/drawingml/2011/main" xmlns:a14="http://schemas.microsoft.com/office/drawing/2010/main" xmlns:m="http://schemas.openxmlformats.org/officeDocument/2006/math" xmlns="" val="1"/>
+              <ma14:wrappingTextBoxFlag xmlns="" xmlns:m="http://schemas.openxmlformats.org/officeDocument/2006/math" xmlns:a14="http://schemas.microsoft.com/office/drawing/2010/main" xmlns:ma14="http://schemas.microsoft.com/office/mac/drawingml/2011/main" val="1"/>
             </a:ext>
           </a:extLst>
         </p:spPr>
@@ -2994,7 +2999,7 @@
           </a:ln>
           <a:extLst>
             <a:ext uri="{C572A759-6A51-4108-AA02-DFA0A04FC94B}">
-              <ma14:wrappingTextBoxFlag xmlns:ma14="http://schemas.microsoft.com/office/mac/drawingml/2011/main" xmlns:a14="http://schemas.microsoft.com/office/drawing/2010/main" xmlns:m="http://schemas.openxmlformats.org/officeDocument/2006/math" xmlns="" val="1"/>
+              <ma14:wrappingTextBoxFlag xmlns="" xmlns:m="http://schemas.openxmlformats.org/officeDocument/2006/math" xmlns:a14="http://schemas.microsoft.com/office/drawing/2010/main" xmlns:ma14="http://schemas.microsoft.com/office/mac/drawingml/2011/main" val="1"/>
             </a:ext>
           </a:extLst>
         </p:spPr>
@@ -3009,9 +3014,9 @@
                 <a:solidFill>
                   <a:srgbClr val="000000"/>
                 </a:solidFill>
-                <a:latin typeface="Circular Std"/>
-                <a:ea typeface="Circular Std"/>
-                <a:cs typeface="Circular Std"/>
+                <a:latin typeface="CircularStd-Bold"/>
+                <a:ea typeface="CircularStd-Bold"/>
+                <a:cs typeface="CircularStd-Bold"/>
                 <a:sym typeface="Circular Std"/>
               </a:defRPr>
             </a:pPr>
@@ -3025,9 +3030,9 @@
                 <a:solidFill>
                   <a:srgbClr val="000000"/>
                 </a:solidFill>
-                <a:latin typeface="Circular Std"/>
-                <a:ea typeface="Circular Std"/>
-                <a:cs typeface="Circular Std"/>
+                <a:latin typeface="CircularStd-Bold"/>
+                <a:ea typeface="CircularStd-Bold"/>
+                <a:cs typeface="CircularStd-Bold"/>
                 <a:sym typeface="Circular Std"/>
               </a:defRPr>
             </a:pPr>
@@ -3041,9 +3046,9 @@
                 <a:solidFill>
                   <a:srgbClr val="000000"/>
                 </a:solidFill>
-                <a:latin typeface="Circular Std"/>
-                <a:ea typeface="Circular Std"/>
-                <a:cs typeface="Circular Std"/>
+                <a:latin typeface="CircularStd-Bold"/>
+                <a:ea typeface="CircularStd-Bold"/>
+                <a:cs typeface="CircularStd-Bold"/>
                 <a:sym typeface="Circular Std"/>
               </a:defRPr>
             </a:pPr>
@@ -3057,9 +3062,9 @@
                 <a:solidFill>
                   <a:srgbClr val="FFFFFF"/>
                 </a:solidFill>
-                <a:latin typeface="Circular Std"/>
-                <a:ea typeface="Circular Std"/>
-                <a:cs typeface="Circular Std"/>
+                <a:latin typeface="CircularStd-Bold"/>
+                <a:ea typeface="CircularStd-Bold"/>
+                <a:cs typeface="CircularStd-Bold"/>
                 <a:sym typeface="Circular Std"/>
               </a:defRPr>
             </a:pPr>
@@ -3071,9 +3076,9 @@
                 <a:solidFill>
                   <a:srgbClr val="000000"/>
                 </a:solidFill>
-                <a:latin typeface="Circular Std"/>
-                <a:ea typeface="Circular Std"/>
-                <a:cs typeface="Circular Std"/>
+                <a:latin typeface="CircularStd-Bold"/>
+                <a:ea typeface="CircularStd-Bold"/>
+                <a:cs typeface="CircularStd-Bold"/>
                 <a:sym typeface="Circular Std"/>
               </a:defRPr>
             </a:pPr>
@@ -3182,7 +3187,7 @@
           </a:ln>
           <a:extLst>
             <a:ext uri="{C572A759-6A51-4108-AA02-DFA0A04FC94B}">
-              <ma14:wrappingTextBoxFlag xmlns:ma14="http://schemas.microsoft.com/office/mac/drawingml/2011/main" xmlns:a14="http://schemas.microsoft.com/office/drawing/2010/main" xmlns:m="http://schemas.openxmlformats.org/officeDocument/2006/math" xmlns="" val="1"/>
+              <ma14:wrappingTextBoxFlag xmlns="" xmlns:m="http://schemas.openxmlformats.org/officeDocument/2006/math" xmlns:a14="http://schemas.microsoft.com/office/drawing/2010/main" xmlns:ma14="http://schemas.microsoft.com/office/mac/drawingml/2011/main" val="1"/>
             </a:ext>
           </a:extLst>
         </p:spPr>
@@ -3241,7 +3246,7 @@
           </a:ln>
           <a:extLst>
             <a:ext uri="{C572A759-6A51-4108-AA02-DFA0A04FC94B}">
-              <ma14:wrappingTextBoxFlag xmlns:ma14="http://schemas.microsoft.com/office/mac/drawingml/2011/main" xmlns:a14="http://schemas.microsoft.com/office/drawing/2010/main" xmlns:m="http://schemas.openxmlformats.org/officeDocument/2006/math" xmlns="" val="1"/>
+              <ma14:wrappingTextBoxFlag xmlns="" xmlns:m="http://schemas.openxmlformats.org/officeDocument/2006/math" xmlns:a14="http://schemas.microsoft.com/office/drawing/2010/main" xmlns:ma14="http://schemas.microsoft.com/office/mac/drawingml/2011/main" val="1"/>
             </a:ext>
           </a:extLst>
         </p:spPr>
@@ -3341,7 +3346,7 @@
           </a:ln>
           <a:extLst>
             <a:ext uri="{C572A759-6A51-4108-AA02-DFA0A04FC94B}">
-              <ma14:wrappingTextBoxFlag xmlns:ma14="http://schemas.microsoft.com/office/mac/drawingml/2011/main" xmlns:a14="http://schemas.microsoft.com/office/drawing/2010/main" xmlns:m="http://schemas.openxmlformats.org/officeDocument/2006/math" xmlns="" val="1"/>
+              <ma14:wrappingTextBoxFlag xmlns="" xmlns:m="http://schemas.openxmlformats.org/officeDocument/2006/math" xmlns:a14="http://schemas.microsoft.com/office/drawing/2010/main" xmlns:ma14="http://schemas.microsoft.com/office/mac/drawingml/2011/main" val="1"/>
             </a:ext>
           </a:extLst>
         </p:spPr>
@@ -3431,7 +3436,7 @@
           </a:ln>
           <a:extLst>
             <a:ext uri="{C572A759-6A51-4108-AA02-DFA0A04FC94B}">
-              <ma14:wrappingTextBoxFlag xmlns:ma14="http://schemas.microsoft.com/office/mac/drawingml/2011/main" xmlns:a14="http://schemas.microsoft.com/office/drawing/2010/main" xmlns:m="http://schemas.openxmlformats.org/officeDocument/2006/math" xmlns="" val="1"/>
+              <ma14:wrappingTextBoxFlag xmlns="" xmlns:m="http://schemas.openxmlformats.org/officeDocument/2006/math" xmlns:a14="http://schemas.microsoft.com/office/drawing/2010/main" xmlns:ma14="http://schemas.microsoft.com/office/mac/drawingml/2011/main" val="1"/>
             </a:ext>
           </a:extLst>
         </p:spPr>
@@ -3966,7 +3971,7 @@
           </a:ln>
           <a:extLst>
             <a:ext uri="{C572A759-6A51-4108-AA02-DFA0A04FC94B}">
-              <ma14:wrappingTextBoxFlag xmlns:ma14="http://schemas.microsoft.com/office/mac/drawingml/2011/main" xmlns:a14="http://schemas.microsoft.com/office/drawing/2010/main" xmlns:m="http://schemas.openxmlformats.org/officeDocument/2006/math" xmlns="" val="1"/>
+              <ma14:wrappingTextBoxFlag xmlns="" xmlns:m="http://schemas.openxmlformats.org/officeDocument/2006/math" xmlns:a14="http://schemas.microsoft.com/office/drawing/2010/main" xmlns:ma14="http://schemas.microsoft.com/office/mac/drawingml/2011/main" val="1"/>
             </a:ext>
           </a:extLst>
         </p:spPr>
@@ -4054,7 +4059,7 @@
           </a:ln>
           <a:extLst>
             <a:ext uri="{C572A759-6A51-4108-AA02-DFA0A04FC94B}">
-              <ma14:wrappingTextBoxFlag xmlns:ma14="http://schemas.microsoft.com/office/mac/drawingml/2011/main" xmlns:a14="http://schemas.microsoft.com/office/drawing/2010/main" xmlns:m="http://schemas.openxmlformats.org/officeDocument/2006/math" xmlns="" val="1"/>
+              <ma14:wrappingTextBoxFlag xmlns="" xmlns:m="http://schemas.openxmlformats.org/officeDocument/2006/math" xmlns:a14="http://schemas.microsoft.com/office/drawing/2010/main" xmlns:ma14="http://schemas.microsoft.com/office/mac/drawingml/2011/main" val="1"/>
             </a:ext>
           </a:extLst>
         </p:spPr>
@@ -4113,7 +4118,7 @@
           </a:ln>
           <a:extLst>
             <a:ext uri="{C572A759-6A51-4108-AA02-DFA0A04FC94B}">
-              <ma14:wrappingTextBoxFlag xmlns:ma14="http://schemas.microsoft.com/office/mac/drawingml/2011/main" xmlns:a14="http://schemas.microsoft.com/office/drawing/2010/main" xmlns:m="http://schemas.openxmlformats.org/officeDocument/2006/math" xmlns="" val="1"/>
+              <ma14:wrappingTextBoxFlag xmlns="" xmlns:m="http://schemas.openxmlformats.org/officeDocument/2006/math" xmlns:a14="http://schemas.microsoft.com/office/drawing/2010/main" xmlns:ma14="http://schemas.microsoft.com/office/mac/drawingml/2011/main" val="1"/>
             </a:ext>
           </a:extLst>
         </p:spPr>
@@ -4207,7 +4212,7 @@
           </a:ln>
           <a:extLst>
             <a:ext uri="{C572A759-6A51-4108-AA02-DFA0A04FC94B}">
-              <ma14:wrappingTextBoxFlag xmlns:ma14="http://schemas.microsoft.com/office/mac/drawingml/2011/main" xmlns:a14="http://schemas.microsoft.com/office/drawing/2010/main" xmlns:m="http://schemas.openxmlformats.org/officeDocument/2006/math" xmlns="" val="1"/>
+              <ma14:wrappingTextBoxFlag xmlns="" xmlns:m="http://schemas.openxmlformats.org/officeDocument/2006/math" xmlns:a14="http://schemas.microsoft.com/office/drawing/2010/main" xmlns:ma14="http://schemas.microsoft.com/office/mac/drawingml/2011/main" val="1"/>
             </a:ext>
           </a:extLst>
         </p:spPr>
@@ -4295,7 +4300,7 @@
           </a:ln>
           <a:extLst>
             <a:ext uri="{C572A759-6A51-4108-AA02-DFA0A04FC94B}">
-              <ma14:wrappingTextBoxFlag xmlns:ma14="http://schemas.microsoft.com/office/mac/drawingml/2011/main" xmlns:a14="http://schemas.microsoft.com/office/drawing/2010/main" xmlns:m="http://schemas.openxmlformats.org/officeDocument/2006/math" xmlns="" val="1"/>
+              <ma14:wrappingTextBoxFlag xmlns="" xmlns:m="http://schemas.openxmlformats.org/officeDocument/2006/math" xmlns:a14="http://schemas.microsoft.com/office/drawing/2010/main" xmlns:ma14="http://schemas.microsoft.com/office/mac/drawingml/2011/main" val="1"/>
             </a:ext>
           </a:extLst>
         </p:spPr>
@@ -4383,7 +4388,7 @@
           </a:ln>
           <a:extLst>
             <a:ext uri="{C572A759-6A51-4108-AA02-DFA0A04FC94B}">
-              <ma14:wrappingTextBoxFlag xmlns:ma14="http://schemas.microsoft.com/office/mac/drawingml/2011/main" xmlns:a14="http://schemas.microsoft.com/office/drawing/2010/main" xmlns:m="http://schemas.openxmlformats.org/officeDocument/2006/math" xmlns="" val="1"/>
+              <ma14:wrappingTextBoxFlag xmlns="" xmlns:m="http://schemas.openxmlformats.org/officeDocument/2006/math" xmlns:a14="http://schemas.microsoft.com/office/drawing/2010/main" xmlns:ma14="http://schemas.microsoft.com/office/mac/drawingml/2011/main" val="1"/>
             </a:ext>
           </a:extLst>
         </p:spPr>
@@ -4433,7 +4438,7 @@
           </a:ln>
           <a:extLst>
             <a:ext uri="{C572A759-6A51-4108-AA02-DFA0A04FC94B}">
-              <ma14:wrappingTextBoxFlag xmlns:ma14="http://schemas.microsoft.com/office/mac/drawingml/2011/main" xmlns:a14="http://schemas.microsoft.com/office/drawing/2010/main" xmlns:m="http://schemas.openxmlformats.org/officeDocument/2006/math" xmlns="" val="1"/>
+              <ma14:wrappingTextBoxFlag xmlns="" xmlns:m="http://schemas.openxmlformats.org/officeDocument/2006/math" xmlns:a14="http://schemas.microsoft.com/office/drawing/2010/main" xmlns:ma14="http://schemas.microsoft.com/office/mac/drawingml/2011/main" val="1"/>
             </a:ext>
           </a:extLst>
         </p:spPr>
@@ -4523,7 +4528,7 @@
             <a:effectLst/>
             <a:extLst>
               <a:ext uri="{C572A759-6A51-4108-AA02-DFA0A04FC94B}">
-                <ma14:wrappingTextBoxFlag xmlns:ma14="http://schemas.microsoft.com/office/mac/drawingml/2011/main" xmlns:a14="http://schemas.microsoft.com/office/drawing/2010/main" xmlns:m="http://schemas.openxmlformats.org/officeDocument/2006/math" xmlns="" val="1"/>
+                <ma14:wrappingTextBoxFlag xmlns="" xmlns:m="http://schemas.openxmlformats.org/officeDocument/2006/math" xmlns:a14="http://schemas.microsoft.com/office/drawing/2010/main" xmlns:ma14="http://schemas.microsoft.com/office/mac/drawingml/2011/main" val="1"/>
               </a:ext>
             </a:extLst>
           </p:spPr>
@@ -4577,7 +4582,7 @@
             <a:effectLst/>
             <a:extLst>
               <a:ext uri="{C572A759-6A51-4108-AA02-DFA0A04FC94B}">
-                <ma14:wrappingTextBoxFlag xmlns:ma14="http://schemas.microsoft.com/office/mac/drawingml/2011/main" xmlns:a14="http://schemas.microsoft.com/office/drawing/2010/main" xmlns:m="http://schemas.openxmlformats.org/officeDocument/2006/math" xmlns="" val="1"/>
+                <ma14:wrappingTextBoxFlag xmlns="" xmlns:m="http://schemas.openxmlformats.org/officeDocument/2006/math" xmlns:a14="http://schemas.microsoft.com/office/drawing/2010/main" xmlns:ma14="http://schemas.microsoft.com/office/mac/drawingml/2011/main" val="1"/>
               </a:ext>
             </a:extLst>
           </p:spPr>
@@ -4678,7 +4683,7 @@
           </a:ln>
           <a:extLst>
             <a:ext uri="{C572A759-6A51-4108-AA02-DFA0A04FC94B}">
-              <ma14:wrappingTextBoxFlag xmlns:ma14="http://schemas.microsoft.com/office/mac/drawingml/2011/main" xmlns:a14="http://schemas.microsoft.com/office/drawing/2010/main" xmlns:m="http://schemas.openxmlformats.org/officeDocument/2006/math" xmlns="" val="1"/>
+              <ma14:wrappingTextBoxFlag xmlns="" xmlns:m="http://schemas.openxmlformats.org/officeDocument/2006/math" xmlns:a14="http://schemas.microsoft.com/office/drawing/2010/main" xmlns:ma14="http://schemas.microsoft.com/office/mac/drawingml/2011/main" val="1"/>
             </a:ext>
           </a:extLst>
         </p:spPr>
@@ -4802,7 +4807,7 @@
           </a:ln>
           <a:extLst>
             <a:ext uri="{C572A759-6A51-4108-AA02-DFA0A04FC94B}">
-              <ma14:wrappingTextBoxFlag xmlns:ma14="http://schemas.microsoft.com/office/mac/drawingml/2011/main" xmlns:a14="http://schemas.microsoft.com/office/drawing/2010/main" xmlns:m="http://schemas.openxmlformats.org/officeDocument/2006/math" xmlns="" val="1"/>
+              <ma14:wrappingTextBoxFlag xmlns="" xmlns:m="http://schemas.openxmlformats.org/officeDocument/2006/math" xmlns:a14="http://schemas.microsoft.com/office/drawing/2010/main" xmlns:ma14="http://schemas.microsoft.com/office/mac/drawingml/2011/main" val="1"/>
             </a:ext>
           </a:extLst>
         </p:spPr>
@@ -4887,7 +4892,7 @@
           </a:ln>
           <a:extLst>
             <a:ext uri="{C572A759-6A51-4108-AA02-DFA0A04FC94B}">
-              <ma14:wrappingTextBoxFlag xmlns:ma14="http://schemas.microsoft.com/office/mac/drawingml/2011/main" xmlns:a14="http://schemas.microsoft.com/office/drawing/2010/main" xmlns:m="http://schemas.openxmlformats.org/officeDocument/2006/math" xmlns="" val="1"/>
+              <ma14:wrappingTextBoxFlag xmlns="" xmlns:m="http://schemas.openxmlformats.org/officeDocument/2006/math" xmlns:a14="http://schemas.microsoft.com/office/drawing/2010/main" xmlns:ma14="http://schemas.microsoft.com/office/mac/drawingml/2011/main" val="1"/>
             </a:ext>
           </a:extLst>
         </p:spPr>
@@ -4946,7 +4951,7 @@
           </a:ln>
           <a:extLst>
             <a:ext uri="{C572A759-6A51-4108-AA02-DFA0A04FC94B}">
-              <ma14:wrappingTextBoxFlag xmlns:ma14="http://schemas.microsoft.com/office/mac/drawingml/2011/main" xmlns:a14="http://schemas.microsoft.com/office/drawing/2010/main" xmlns:m="http://schemas.openxmlformats.org/officeDocument/2006/math" xmlns="" val="1"/>
+              <ma14:wrappingTextBoxFlag xmlns="" xmlns:m="http://schemas.openxmlformats.org/officeDocument/2006/math" xmlns:a14="http://schemas.microsoft.com/office/drawing/2010/main" xmlns:ma14="http://schemas.microsoft.com/office/mac/drawingml/2011/main" val="1"/>
             </a:ext>
           </a:extLst>
         </p:spPr>
@@ -5067,7 +5072,7 @@
           </a:ln>
           <a:extLst>
             <a:ext uri="{C572A759-6A51-4108-AA02-DFA0A04FC94B}">
-              <ma14:wrappingTextBoxFlag xmlns:ma14="http://schemas.microsoft.com/office/mac/drawingml/2011/main" xmlns:a14="http://schemas.microsoft.com/office/drawing/2010/main" xmlns:m="http://schemas.openxmlformats.org/officeDocument/2006/math" xmlns="" val="1"/>
+              <ma14:wrappingTextBoxFlag xmlns="" xmlns:m="http://schemas.openxmlformats.org/officeDocument/2006/math" xmlns:a14="http://schemas.microsoft.com/office/drawing/2010/main" xmlns:ma14="http://schemas.microsoft.com/office/mac/drawingml/2011/main" val="1"/>
             </a:ext>
           </a:extLst>
         </p:spPr>
@@ -5288,7 +5293,7 @@
           </a:ln>
           <a:extLst>
             <a:ext uri="{C572A759-6A51-4108-AA02-DFA0A04FC94B}">
-              <ma14:wrappingTextBoxFlag xmlns:ma14="http://schemas.microsoft.com/office/mac/drawingml/2011/main" xmlns:a14="http://schemas.microsoft.com/office/drawing/2010/main" xmlns:m="http://schemas.openxmlformats.org/officeDocument/2006/math" xmlns="" val="1"/>
+              <ma14:wrappingTextBoxFlag xmlns="" xmlns:m="http://schemas.openxmlformats.org/officeDocument/2006/math" xmlns:a14="http://schemas.microsoft.com/office/drawing/2010/main" xmlns:ma14="http://schemas.microsoft.com/office/mac/drawingml/2011/main" val="1"/>
             </a:ext>
           </a:extLst>
         </p:spPr>
@@ -5357,7 +5362,7 @@
           </a:ln>
           <a:extLst>
             <a:ext uri="{C572A759-6A51-4108-AA02-DFA0A04FC94B}">
-              <ma14:wrappingTextBoxFlag xmlns:ma14="http://schemas.microsoft.com/office/mac/drawingml/2011/main" xmlns:a14="http://schemas.microsoft.com/office/drawing/2010/main" xmlns:m="http://schemas.openxmlformats.org/officeDocument/2006/math" xmlns="" val="1"/>
+              <ma14:wrappingTextBoxFlag xmlns="" xmlns:m="http://schemas.openxmlformats.org/officeDocument/2006/math" xmlns:a14="http://schemas.microsoft.com/office/drawing/2010/main" xmlns:ma14="http://schemas.microsoft.com/office/mac/drawingml/2011/main" val="1"/>
             </a:ext>
           </a:extLst>
         </p:spPr>
@@ -5910,7 +5915,7 @@
           </a:ln>
           <a:extLst>
             <a:ext uri="{C572A759-6A51-4108-AA02-DFA0A04FC94B}">
-              <ma14:wrappingTextBoxFlag xmlns:ma14="http://schemas.microsoft.com/office/mac/drawingml/2011/main" xmlns:a14="http://schemas.microsoft.com/office/drawing/2010/main" xmlns:m="http://schemas.openxmlformats.org/officeDocument/2006/math" xmlns="" val="1"/>
+              <ma14:wrappingTextBoxFlag xmlns="" xmlns:m="http://schemas.openxmlformats.org/officeDocument/2006/math" xmlns:a14="http://schemas.microsoft.com/office/drawing/2010/main" xmlns:ma14="http://schemas.microsoft.com/office/mac/drawingml/2011/main" val="1"/>
             </a:ext>
           </a:extLst>
         </p:spPr>
@@ -5980,7 +5985,7 @@
           </a:ln>
           <a:extLst>
             <a:ext uri="{C572A759-6A51-4108-AA02-DFA0A04FC94B}">
-              <ma14:wrappingTextBoxFlag xmlns:ma14="http://schemas.microsoft.com/office/mac/drawingml/2011/main" xmlns:a14="http://schemas.microsoft.com/office/drawing/2010/main" xmlns:m="http://schemas.openxmlformats.org/officeDocument/2006/math" xmlns="" val="1"/>
+              <ma14:wrappingTextBoxFlag xmlns="" xmlns:m="http://schemas.openxmlformats.org/officeDocument/2006/math" xmlns:a14="http://schemas.microsoft.com/office/drawing/2010/main" xmlns:ma14="http://schemas.microsoft.com/office/mac/drawingml/2011/main" val="1"/>
             </a:ext>
           </a:extLst>
         </p:spPr>
@@ -6039,7 +6044,7 @@
           </a:ln>
           <a:extLst>
             <a:ext uri="{C572A759-6A51-4108-AA02-DFA0A04FC94B}">
-              <ma14:wrappingTextBoxFlag xmlns:ma14="http://schemas.microsoft.com/office/mac/drawingml/2011/main" xmlns:a14="http://schemas.microsoft.com/office/drawing/2010/main" xmlns:m="http://schemas.openxmlformats.org/officeDocument/2006/math" xmlns="" val="1"/>
+              <ma14:wrappingTextBoxFlag xmlns="" xmlns:m="http://schemas.openxmlformats.org/officeDocument/2006/math" xmlns:a14="http://schemas.microsoft.com/office/drawing/2010/main" xmlns:ma14="http://schemas.microsoft.com/office/mac/drawingml/2011/main" val="1"/>
             </a:ext>
           </a:extLst>
         </p:spPr>
@@ -6210,7 +6215,7 @@
           </a:ln>
           <a:extLst>
             <a:ext uri="{C572A759-6A51-4108-AA02-DFA0A04FC94B}">
-              <ma14:wrappingTextBoxFlag xmlns:ma14="http://schemas.microsoft.com/office/mac/drawingml/2011/main" xmlns:a14="http://schemas.microsoft.com/office/drawing/2010/main" xmlns:m="http://schemas.openxmlformats.org/officeDocument/2006/math" xmlns="" val="1"/>
+              <ma14:wrappingTextBoxFlag xmlns="" xmlns:m="http://schemas.openxmlformats.org/officeDocument/2006/math" xmlns:a14="http://schemas.microsoft.com/office/drawing/2010/main" xmlns:ma14="http://schemas.microsoft.com/office/mac/drawingml/2011/main" val="1"/>
             </a:ext>
           </a:extLst>
         </p:spPr>
@@ -6282,7 +6287,7 @@
           </a:ln>
           <a:extLst>
             <a:ext uri="{C572A759-6A51-4108-AA02-DFA0A04FC94B}">
-              <ma14:wrappingTextBoxFlag xmlns:ma14="http://schemas.microsoft.com/office/mac/drawingml/2011/main" xmlns:a14="http://schemas.microsoft.com/office/drawing/2010/main" xmlns:m="http://schemas.openxmlformats.org/officeDocument/2006/math" xmlns="" val="1"/>
+              <ma14:wrappingTextBoxFlag xmlns="" xmlns:m="http://schemas.openxmlformats.org/officeDocument/2006/math" xmlns:a14="http://schemas.microsoft.com/office/drawing/2010/main" xmlns:ma14="http://schemas.microsoft.com/office/mac/drawingml/2011/main" val="1"/>
             </a:ext>
           </a:extLst>
         </p:spPr>
@@ -6430,7 +6435,7 @@
           </a:ln>
           <a:extLst>
             <a:ext uri="{C572A759-6A51-4108-AA02-DFA0A04FC94B}">
-              <ma14:wrappingTextBoxFlag xmlns:ma14="http://schemas.microsoft.com/office/mac/drawingml/2011/main" xmlns:a14="http://schemas.microsoft.com/office/drawing/2010/main" xmlns:m="http://schemas.openxmlformats.org/officeDocument/2006/math" xmlns="" val="1"/>
+              <ma14:wrappingTextBoxFlag xmlns="" xmlns:m="http://schemas.openxmlformats.org/officeDocument/2006/math" xmlns:a14="http://schemas.microsoft.com/office/drawing/2010/main" xmlns:ma14="http://schemas.microsoft.com/office/mac/drawingml/2011/main" val="1"/>
             </a:ext>
           </a:extLst>
         </p:spPr>
@@ -6489,7 +6494,7 @@
           </a:ln>
           <a:extLst>
             <a:ext uri="{C572A759-6A51-4108-AA02-DFA0A04FC94B}">
-              <ma14:wrappingTextBoxFlag xmlns:ma14="http://schemas.microsoft.com/office/mac/drawingml/2011/main" xmlns:a14="http://schemas.microsoft.com/office/drawing/2010/main" xmlns:m="http://schemas.openxmlformats.org/officeDocument/2006/math" xmlns="" val="1"/>
+              <ma14:wrappingTextBoxFlag xmlns="" xmlns:m="http://schemas.openxmlformats.org/officeDocument/2006/math" xmlns:a14="http://schemas.microsoft.com/office/drawing/2010/main" xmlns:ma14="http://schemas.microsoft.com/office/mac/drawingml/2011/main" val="1"/>
             </a:ext>
           </a:extLst>
         </p:spPr>
@@ -6574,7 +6579,7 @@
           </a:ln>
           <a:extLst>
             <a:ext uri="{C572A759-6A51-4108-AA02-DFA0A04FC94B}">
-              <ma14:wrappingTextBoxFlag xmlns:ma14="http://schemas.microsoft.com/office/mac/drawingml/2011/main" xmlns:a14="http://schemas.microsoft.com/office/drawing/2010/main" xmlns:m="http://schemas.openxmlformats.org/officeDocument/2006/math" xmlns="" val="1"/>
+              <ma14:wrappingTextBoxFlag xmlns="" xmlns:m="http://schemas.openxmlformats.org/officeDocument/2006/math" xmlns:a14="http://schemas.microsoft.com/office/drawing/2010/main" xmlns:ma14="http://schemas.microsoft.com/office/mac/drawingml/2011/main" val="1"/>
             </a:ext>
           </a:extLst>
         </p:spPr>
@@ -6644,7 +6649,7 @@
           </a:ln>
           <a:extLst>
             <a:ext uri="{C572A759-6A51-4108-AA02-DFA0A04FC94B}">
-              <ma14:wrappingTextBoxFlag xmlns:ma14="http://schemas.microsoft.com/office/mac/drawingml/2011/main" xmlns:a14="http://schemas.microsoft.com/office/drawing/2010/main" xmlns:m="http://schemas.openxmlformats.org/officeDocument/2006/math" xmlns="" val="1"/>
+              <ma14:wrappingTextBoxFlag xmlns="" xmlns:m="http://schemas.openxmlformats.org/officeDocument/2006/math" xmlns:a14="http://schemas.microsoft.com/office/drawing/2010/main" xmlns:ma14="http://schemas.microsoft.com/office/mac/drawingml/2011/main" val="1"/>
             </a:ext>
           </a:extLst>
         </p:spPr>
@@ -6918,7 +6923,7 @@
           </a:ln>
           <a:extLst>
             <a:ext uri="{C572A759-6A51-4108-AA02-DFA0A04FC94B}">
-              <ma14:wrappingTextBoxFlag xmlns:ma14="http://schemas.microsoft.com/office/mac/drawingml/2011/main" xmlns:a14="http://schemas.microsoft.com/office/drawing/2010/main" xmlns:m="http://schemas.openxmlformats.org/officeDocument/2006/math" xmlns="" val="1"/>
+              <ma14:wrappingTextBoxFlag xmlns="" xmlns:m="http://schemas.openxmlformats.org/officeDocument/2006/math" xmlns:a14="http://schemas.microsoft.com/office/drawing/2010/main" xmlns:ma14="http://schemas.microsoft.com/office/mac/drawingml/2011/main" val="1"/>
             </a:ext>
           </a:extLst>
         </p:spPr>
@@ -6985,7 +6990,7 @@
           </a:ln>
           <a:extLst>
             <a:ext uri="{C572A759-6A51-4108-AA02-DFA0A04FC94B}">
-              <ma14:wrappingTextBoxFlag xmlns:ma14="http://schemas.microsoft.com/office/mac/drawingml/2011/main" xmlns:a14="http://schemas.microsoft.com/office/drawing/2010/main" xmlns:m="http://schemas.openxmlformats.org/officeDocument/2006/math" xmlns="" val="1"/>
+              <ma14:wrappingTextBoxFlag xmlns="" xmlns:m="http://schemas.openxmlformats.org/officeDocument/2006/math" xmlns:a14="http://schemas.microsoft.com/office/drawing/2010/main" xmlns:ma14="http://schemas.microsoft.com/office/mac/drawingml/2011/main" val="1"/>
             </a:ext>
           </a:extLst>
         </p:spPr>
@@ -7029,7 +7034,7 @@
           </a:ln>
           <a:extLst>
             <a:ext uri="{C572A759-6A51-4108-AA02-DFA0A04FC94B}">
-              <ma14:wrappingTextBoxFlag xmlns:ma14="http://schemas.microsoft.com/office/mac/drawingml/2011/main" xmlns:a14="http://schemas.microsoft.com/office/drawing/2010/main" xmlns:m="http://schemas.openxmlformats.org/officeDocument/2006/math" xmlns="" val="1"/>
+              <ma14:wrappingTextBoxFlag xmlns="" xmlns:m="http://schemas.openxmlformats.org/officeDocument/2006/math" xmlns:a14="http://schemas.microsoft.com/office/drawing/2010/main" xmlns:ma14="http://schemas.microsoft.com/office/mac/drawingml/2011/main" val="1"/>
             </a:ext>
           </a:extLst>
         </p:spPr>
@@ -7205,7 +7210,7 @@
           </a:ln>
           <a:extLst>
             <a:ext uri="{C572A759-6A51-4108-AA02-DFA0A04FC94B}">
-              <ma14:wrappingTextBoxFlag xmlns:ma14="http://schemas.microsoft.com/office/mac/drawingml/2011/main" xmlns:a14="http://schemas.microsoft.com/office/drawing/2010/main" xmlns:m="http://schemas.openxmlformats.org/officeDocument/2006/math" xmlns="" val="1"/>
+              <ma14:wrappingTextBoxFlag xmlns="" xmlns:m="http://schemas.openxmlformats.org/officeDocument/2006/math" xmlns:a14="http://schemas.microsoft.com/office/drawing/2010/main" xmlns:ma14="http://schemas.microsoft.com/office/mac/drawingml/2011/main" val="1"/>
             </a:ext>
           </a:extLst>
         </p:spPr>
@@ -7264,7 +7269,7 @@
           </a:ln>
           <a:extLst>
             <a:ext uri="{C572A759-6A51-4108-AA02-DFA0A04FC94B}">
-              <ma14:wrappingTextBoxFlag xmlns:ma14="http://schemas.microsoft.com/office/mac/drawingml/2011/main" xmlns:a14="http://schemas.microsoft.com/office/drawing/2010/main" xmlns:m="http://schemas.openxmlformats.org/officeDocument/2006/math" xmlns="" val="1"/>
+              <ma14:wrappingTextBoxFlag xmlns="" xmlns:m="http://schemas.openxmlformats.org/officeDocument/2006/math" xmlns:a14="http://schemas.microsoft.com/office/drawing/2010/main" xmlns:ma14="http://schemas.microsoft.com/office/mac/drawingml/2011/main" val="1"/>
             </a:ext>
           </a:extLst>
         </p:spPr>
@@ -7356,7 +7361,7 @@
           </a:ln>
           <a:extLst>
             <a:ext uri="{C572A759-6A51-4108-AA02-DFA0A04FC94B}">
-              <ma14:wrappingTextBoxFlag xmlns:ma14="http://schemas.microsoft.com/office/mac/drawingml/2011/main" xmlns:a14="http://schemas.microsoft.com/office/drawing/2010/main" xmlns:m="http://schemas.openxmlformats.org/officeDocument/2006/math" xmlns="" val="1"/>
+              <ma14:wrappingTextBoxFlag xmlns="" xmlns:m="http://schemas.openxmlformats.org/officeDocument/2006/math" xmlns:a14="http://schemas.microsoft.com/office/drawing/2010/main" xmlns:ma14="http://schemas.microsoft.com/office/mac/drawingml/2011/main" val="1"/>
             </a:ext>
           </a:extLst>
         </p:spPr>
@@ -7446,7 +7451,7 @@
           </a:ln>
           <a:extLst>
             <a:ext uri="{C572A759-6A51-4108-AA02-DFA0A04FC94B}">
-              <ma14:wrappingTextBoxFlag xmlns:ma14="http://schemas.microsoft.com/office/mac/drawingml/2011/main" xmlns:a14="http://schemas.microsoft.com/office/drawing/2010/main" xmlns:m="http://schemas.openxmlformats.org/officeDocument/2006/math" xmlns="" val="1"/>
+              <ma14:wrappingTextBoxFlag xmlns="" xmlns:m="http://schemas.openxmlformats.org/officeDocument/2006/math" xmlns:a14="http://schemas.microsoft.com/office/drawing/2010/main" xmlns:ma14="http://schemas.microsoft.com/office/mac/drawingml/2011/main" val="1"/>
             </a:ext>
           </a:extLst>
         </p:spPr>
@@ -7536,7 +7541,7 @@
           </a:ln>
           <a:extLst>
             <a:ext uri="{C572A759-6A51-4108-AA02-DFA0A04FC94B}">
-              <ma14:wrappingTextBoxFlag xmlns:ma14="http://schemas.microsoft.com/office/mac/drawingml/2011/main" xmlns:a14="http://schemas.microsoft.com/office/drawing/2010/main" xmlns:m="http://schemas.openxmlformats.org/officeDocument/2006/math" xmlns="" val="1"/>
+              <ma14:wrappingTextBoxFlag xmlns="" xmlns:m="http://schemas.openxmlformats.org/officeDocument/2006/math" xmlns:a14="http://schemas.microsoft.com/office/drawing/2010/main" xmlns:ma14="http://schemas.microsoft.com/office/mac/drawingml/2011/main" val="1"/>
             </a:ext>
           </a:extLst>
         </p:spPr>
@@ -8132,7 +8137,7 @@
           </a:ln>
           <a:extLst>
             <a:ext uri="{C572A759-6A51-4108-AA02-DFA0A04FC94B}">
-              <ma14:wrappingTextBoxFlag xmlns:ma14="http://schemas.microsoft.com/office/mac/drawingml/2011/main" xmlns:a14="http://schemas.microsoft.com/office/drawing/2010/main" xmlns:m="http://schemas.openxmlformats.org/officeDocument/2006/math" xmlns="" val="1"/>
+              <ma14:wrappingTextBoxFlag xmlns="" xmlns:m="http://schemas.openxmlformats.org/officeDocument/2006/math" xmlns:a14="http://schemas.microsoft.com/office/drawing/2010/main" xmlns:ma14="http://schemas.microsoft.com/office/mac/drawingml/2011/main" val="1"/>
             </a:ext>
           </a:extLst>
         </p:spPr>
@@ -8191,7 +8196,7 @@
           </a:ln>
           <a:extLst>
             <a:ext uri="{C572A759-6A51-4108-AA02-DFA0A04FC94B}">
-              <ma14:wrappingTextBoxFlag xmlns:ma14="http://schemas.microsoft.com/office/mac/drawingml/2011/main" xmlns:a14="http://schemas.microsoft.com/office/drawing/2010/main" xmlns:m="http://schemas.openxmlformats.org/officeDocument/2006/math" xmlns="" val="1"/>
+              <ma14:wrappingTextBoxFlag xmlns="" xmlns:m="http://schemas.openxmlformats.org/officeDocument/2006/math" xmlns:a14="http://schemas.microsoft.com/office/drawing/2010/main" xmlns:ma14="http://schemas.microsoft.com/office/mac/drawingml/2011/main" val="1"/>
             </a:ext>
           </a:extLst>
         </p:spPr>
@@ -8273,7 +8278,7 @@
           </a:ln>
           <a:extLst>
             <a:ext uri="{C572A759-6A51-4108-AA02-DFA0A04FC94B}">
-              <ma14:wrappingTextBoxFlag xmlns:ma14="http://schemas.microsoft.com/office/mac/drawingml/2011/main" xmlns:a14="http://schemas.microsoft.com/office/drawing/2010/main" xmlns:m="http://schemas.openxmlformats.org/officeDocument/2006/math" xmlns="" val="1"/>
+              <ma14:wrappingTextBoxFlag xmlns="" xmlns:m="http://schemas.openxmlformats.org/officeDocument/2006/math" xmlns:a14="http://schemas.microsoft.com/office/drawing/2010/main" xmlns:ma14="http://schemas.microsoft.com/office/mac/drawingml/2011/main" val="1"/>
             </a:ext>
           </a:extLst>
         </p:spPr>
@@ -8436,7 +8441,7 @@
           </a:ln>
           <a:extLst>
             <a:ext uri="{C572A759-6A51-4108-AA02-DFA0A04FC94B}">
-              <ma14:wrappingTextBoxFlag xmlns:ma14="http://schemas.microsoft.com/office/mac/drawingml/2011/main" xmlns:a14="http://schemas.microsoft.com/office/drawing/2010/main" xmlns:m="http://schemas.openxmlformats.org/officeDocument/2006/math" xmlns="" val="1"/>
+              <ma14:wrappingTextBoxFlag xmlns="" xmlns:m="http://schemas.openxmlformats.org/officeDocument/2006/math" xmlns:a14="http://schemas.microsoft.com/office/drawing/2010/main" xmlns:ma14="http://schemas.microsoft.com/office/mac/drawingml/2011/main" val="1"/>
             </a:ext>
           </a:extLst>
         </p:spPr>
@@ -8605,7 +8610,7 @@
           </a:ln>
           <a:extLst>
             <a:ext uri="{C572A759-6A51-4108-AA02-DFA0A04FC94B}">
-              <ma14:wrappingTextBoxFlag xmlns:ma14="http://schemas.microsoft.com/office/mac/drawingml/2011/main" xmlns:a14="http://schemas.microsoft.com/office/drawing/2010/main" xmlns:m="http://schemas.openxmlformats.org/officeDocument/2006/math" xmlns="" val="1"/>
+              <ma14:wrappingTextBoxFlag xmlns="" xmlns:m="http://schemas.openxmlformats.org/officeDocument/2006/math" xmlns:a14="http://schemas.microsoft.com/office/drawing/2010/main" xmlns:ma14="http://schemas.microsoft.com/office/mac/drawingml/2011/main" val="1"/>
             </a:ext>
           </a:extLst>
         </p:spPr>
@@ -8664,7 +8669,7 @@
           </a:ln>
           <a:extLst>
             <a:ext uri="{C572A759-6A51-4108-AA02-DFA0A04FC94B}">
-              <ma14:wrappingTextBoxFlag xmlns:ma14="http://schemas.microsoft.com/office/mac/drawingml/2011/main" xmlns:a14="http://schemas.microsoft.com/office/drawing/2010/main" xmlns:m="http://schemas.openxmlformats.org/officeDocument/2006/math" xmlns="" val="1"/>
+              <ma14:wrappingTextBoxFlag xmlns="" xmlns:m="http://schemas.openxmlformats.org/officeDocument/2006/math" xmlns:a14="http://schemas.microsoft.com/office/drawing/2010/main" xmlns:ma14="http://schemas.microsoft.com/office/mac/drawingml/2011/main" val="1"/>
             </a:ext>
           </a:extLst>
         </p:spPr>
@@ -8767,7 +8772,7 @@
           </a:ln>
           <a:extLst>
             <a:ext uri="{C572A759-6A51-4108-AA02-DFA0A04FC94B}">
-              <ma14:wrappingTextBoxFlag xmlns:ma14="http://schemas.microsoft.com/office/mac/drawingml/2011/main" xmlns:a14="http://schemas.microsoft.com/office/drawing/2010/main" xmlns:m="http://schemas.openxmlformats.org/officeDocument/2006/math" xmlns="" val="1"/>
+              <ma14:wrappingTextBoxFlag xmlns="" xmlns:m="http://schemas.openxmlformats.org/officeDocument/2006/math" xmlns:a14="http://schemas.microsoft.com/office/drawing/2010/main" xmlns:ma14="http://schemas.microsoft.com/office/mac/drawingml/2011/main" val="1"/>
             </a:ext>
           </a:extLst>
         </p:spPr>
@@ -8818,7 +8823,7 @@
           </a:ln>
           <a:extLst>
             <a:ext uri="{C572A759-6A51-4108-AA02-DFA0A04FC94B}">
-              <ma14:wrappingTextBoxFlag xmlns:ma14="http://schemas.microsoft.com/office/mac/drawingml/2011/main" xmlns:a14="http://schemas.microsoft.com/office/drawing/2010/main" xmlns:m="http://schemas.openxmlformats.org/officeDocument/2006/math" xmlns="" val="1"/>
+              <ma14:wrappingTextBoxFlag xmlns="" xmlns:m="http://schemas.openxmlformats.org/officeDocument/2006/math" xmlns:a14="http://schemas.microsoft.com/office/drawing/2010/main" xmlns:ma14="http://schemas.microsoft.com/office/mac/drawingml/2011/main" val="1"/>
             </a:ext>
           </a:extLst>
         </p:spPr>
@@ -9392,7 +9397,7 @@
           </a:ln>
           <a:extLst>
             <a:ext uri="{C572A759-6A51-4108-AA02-DFA0A04FC94B}">
-              <ma14:wrappingTextBoxFlag xmlns:ma14="http://schemas.microsoft.com/office/mac/drawingml/2011/main" xmlns:a14="http://schemas.microsoft.com/office/drawing/2010/main" xmlns:m="http://schemas.openxmlformats.org/officeDocument/2006/math" xmlns="" val="1"/>
+              <ma14:wrappingTextBoxFlag xmlns="" xmlns:m="http://schemas.openxmlformats.org/officeDocument/2006/math" xmlns:a14="http://schemas.microsoft.com/office/drawing/2010/main" xmlns:ma14="http://schemas.microsoft.com/office/mac/drawingml/2011/main" val="1"/>
             </a:ext>
           </a:extLst>
         </p:spPr>

</xml_diff>